<commit_message>
added 11-20 in the list of programming languages
</commit_message>
<xml_diff>
--- a/Lecture_1/ABilandzic_PH8124_SS2022.pptx
+++ b/Lecture_1/ABilandzic_PH8124_SS2022.pptx
@@ -5,10 +5,10 @@
     <p:sldMasterId id="2147484288" r:id="rId1"/>
   </p:sldMasterIdLst>
   <p:notesMasterIdLst>
-    <p:notesMasterId r:id="rId35"/>
+    <p:notesMasterId r:id="rId36"/>
   </p:notesMasterIdLst>
   <p:handoutMasterIdLst>
-    <p:handoutMasterId r:id="rId36"/>
+    <p:handoutMasterId r:id="rId37"/>
   </p:handoutMasterIdLst>
   <p:sldIdLst>
     <p:sldId id="785" r:id="rId2"/>
@@ -38,12 +38,13 @@
     <p:sldId id="1248" r:id="rId26"/>
     <p:sldId id="1244" r:id="rId27"/>
     <p:sldId id="1253" r:id="rId28"/>
-    <p:sldId id="1227" r:id="rId29"/>
-    <p:sldId id="1239" r:id="rId30"/>
-    <p:sldId id="1240" r:id="rId31"/>
-    <p:sldId id="1245" r:id="rId32"/>
-    <p:sldId id="1242" r:id="rId33"/>
-    <p:sldId id="1158" r:id="rId34"/>
+    <p:sldId id="1254" r:id="rId29"/>
+    <p:sldId id="1227" r:id="rId30"/>
+    <p:sldId id="1239" r:id="rId31"/>
+    <p:sldId id="1240" r:id="rId32"/>
+    <p:sldId id="1245" r:id="rId33"/>
+    <p:sldId id="1242" r:id="rId34"/>
+    <p:sldId id="1158" r:id="rId35"/>
   </p:sldIdLst>
   <p:sldSz cx="9144000" cy="6858000" type="screen4x3"/>
   <p:notesSz cx="6858000" cy="9144000"/>
@@ -7126,17 +7127,8 @@
           <a:p>
             <a:r>
               <a:rPr lang="en-GB" dirty="0" smtClean="0"/>
-              <a:t>Linux family tree: Common Linux kernel and plethora </a:t>
-            </a:r>
-            <a:r>
-              <a:rPr lang="en-GB" dirty="0" smtClean="0"/>
-              <a:t>of different Linux </a:t>
-            </a:r>
-            <a:r>
-              <a:rPr lang="en-GB" dirty="0" smtClean="0"/>
-              <a:t>distributions built on top of it</a:t>
-            </a:r>
-            <a:endParaRPr lang="en-GB" dirty="0" smtClean="0"/>
+              <a:t>Linux family tree: Common Linux kernel and plethora of different Linux distributions built on top of it</a:t>
+            </a:r>
           </a:p>
           <a:p>
             <a:pPr lvl="1"/>
@@ -7169,17 +7161,8 @@
             <a:pPr lvl="1"/>
             <a:r>
               <a:rPr lang="en-GB" dirty="0" smtClean="0"/>
-              <a:t>Specific: Ubuntu, Fedora, CentOS, Scientific Linux, Linux Mint, etc</a:t>
-            </a:r>
-            <a:r>
-              <a:rPr lang="en-GB" dirty="0" smtClean="0"/>
-              <a:t>.</a:t>
-            </a:r>
-            <a:r>
-              <a:rPr lang="en-GB" dirty="0" smtClean="0"/>
-              <a:t>  </a:t>
-            </a:r>
-            <a:endParaRPr lang="en-GB" dirty="0" smtClean="0"/>
+              <a:t>Specific: Ubuntu, Fedora, CentOS, Scientific Linux, Linux Mint, etc.  </a:t>
+            </a:r>
           </a:p>
           <a:p>
             <a:r>
@@ -7199,11 +7182,7 @@
             </a:r>
             <a:r>
               <a:rPr lang="en-GB" dirty="0" smtClean="0"/>
-              <a:t>, Fedora of Red Hat, etc</a:t>
-            </a:r>
-            <a:r>
-              <a:rPr lang="en-GB" dirty="0" smtClean="0"/>
-              <a:t>. (see complete </a:t>
+              <a:t>, Fedora of Red Hat, etc. (see complete </a:t>
             </a:r>
             <a:r>
               <a:rPr lang="en-GB" dirty="0"/>
@@ -7229,7 +7208,6 @@
               <a:rPr lang="en-GB" dirty="0" smtClean="0"/>
               <a:t>)</a:t>
             </a:r>
-            <a:endParaRPr lang="en-GB" dirty="0" smtClean="0"/>
           </a:p>
           <a:p>
             <a:r>
@@ -9237,7 +9215,6 @@
               <a:rPr lang="da-DK" dirty="0" smtClean="0"/>
               <a:t>Written entirely in C </a:t>
             </a:r>
-            <a:endParaRPr lang="da-DK" dirty="0" smtClean="0"/>
           </a:p>
           <a:p>
             <a:pPr lvl="1"/>
@@ -9245,7 +9222,6 @@
               <a:rPr lang="da-DK" dirty="0" smtClean="0"/>
               <a:t>Linux kernel is mostly written in C</a:t>
             </a:r>
-            <a:endParaRPr lang="da-DK" dirty="0" smtClean="0"/>
           </a:p>
           <a:p>
             <a:r>
@@ -9523,7 +9499,6 @@
               <a:rPr lang="en-GB" dirty="0" smtClean="0"/>
               <a:t>5.1.16 (January 5, 2022)</a:t>
             </a:r>
-            <a:endParaRPr lang="en-GB" dirty="0" smtClean="0"/>
           </a:p>
           <a:p>
             <a:pPr lvl="1"/>
@@ -10235,13 +10210,8 @@
             </a:r>
             <a:r>
               <a:rPr lang="da-DK" dirty="0" smtClean="0"/>
-              <a:t>xamples: Bash, Python, </a:t>
-            </a:r>
-            <a:r>
-              <a:rPr lang="da-DK" dirty="0" smtClean="0"/>
-              <a:t>Mathematica, JavaScript</a:t>
-            </a:r>
-            <a:endParaRPr lang="da-DK" dirty="0" smtClean="0"/>
+              <a:t>xamples: Bash, Python, Mathematica, JavaScript</a:t>
+            </a:r>
           </a:p>
           <a:p>
             <a:r>
@@ -10275,13 +10245,8 @@
             </a:r>
             <a:r>
               <a:rPr lang="da-DK" dirty="0" smtClean="0"/>
-              <a:t>xamples: C, C++, </a:t>
-            </a:r>
-            <a:r>
-              <a:rPr lang="da-DK" dirty="0" smtClean="0"/>
-              <a:t>Java, Go</a:t>
-            </a:r>
-            <a:endParaRPr lang="da-DK" dirty="0" smtClean="0"/>
+              <a:t>xamples: C, C++, Java, Go</a:t>
+            </a:r>
           </a:p>
         </p:txBody>
       </p:sp>
@@ -10448,7 +10413,6 @@
               <a:rPr lang="da-DK" sz="2000" dirty="0" smtClean="0"/>
               <a:t>As of recently, Python is the most popular programming language</a:t>
             </a:r>
-            <a:endParaRPr lang="da-DK" sz="2000" dirty="0" smtClean="0"/>
           </a:p>
         </p:txBody>
       </p:sp>
@@ -10612,6 +10576,249 @@
 </file>
 
 <file path=ppt/slides/slide28.xml><?xml version="1.0" encoding="utf-8"?>
+<p:sld xmlns:a="http://schemas.openxmlformats.org/drawingml/2006/main" xmlns:r="http://schemas.openxmlformats.org/officeDocument/2006/relationships" xmlns:p="http://schemas.openxmlformats.org/presentationml/2006/main">
+  <p:cSld>
+    <p:spTree>
+      <p:nvGrpSpPr>
+        <p:cNvPr id="1" name=""/>
+        <p:cNvGrpSpPr/>
+        <p:nvPr/>
+      </p:nvGrpSpPr>
+      <p:grpSpPr>
+        <a:xfrm>
+          <a:off x="0" y="0"/>
+          <a:ext cx="0" cy="0"/>
+          <a:chOff x="0" y="0"/>
+          <a:chExt cx="0" cy="0"/>
+        </a:xfrm>
+      </p:grpSpPr>
+      <p:sp>
+        <p:nvSpPr>
+          <p:cNvPr id="2" name="Title 1"/>
+          <p:cNvSpPr>
+            <a:spLocks noGrp="1"/>
+          </p:cNvSpPr>
+          <p:nvPr>
+            <p:ph type="title"/>
+          </p:nvPr>
+        </p:nvSpPr>
+        <p:spPr>
+          <a:xfrm>
+            <a:off x="304800" y="533400"/>
+            <a:ext cx="8839200" cy="838200"/>
+          </a:xfrm>
+        </p:spPr>
+        <p:txBody>
+          <a:bodyPr>
+            <a:noAutofit/>
+          </a:bodyPr>
+          <a:lstStyle/>
+          <a:p>
+            <a:r>
+              <a:rPr lang="en-US" sz="3200" b="1" dirty="0" smtClean="0"/>
+              <a:t>Intermezzo: Popularity of languages</a:t>
+            </a:r>
+            <a:endParaRPr lang="en-US" sz="3200" b="1" dirty="0">
+              <a:effectLst/>
+            </a:endParaRPr>
+          </a:p>
+        </p:txBody>
+      </p:sp>
+      <p:sp>
+        <p:nvSpPr>
+          <p:cNvPr id="3" name="Content Placeholder 2"/>
+          <p:cNvSpPr>
+            <a:spLocks noGrp="1"/>
+          </p:cNvSpPr>
+          <p:nvPr>
+            <p:ph idx="1"/>
+          </p:nvPr>
+        </p:nvSpPr>
+        <p:spPr>
+          <a:xfrm>
+            <a:off x="304800" y="1295400"/>
+            <a:ext cx="8686800" cy="3962400"/>
+          </a:xfrm>
+        </p:spPr>
+        <p:txBody>
+          <a:bodyPr>
+            <a:normAutofit/>
+          </a:bodyPr>
+          <a:lstStyle/>
+          <a:p>
+            <a:r>
+              <a:rPr lang="da-DK" sz="2000" dirty="0" smtClean="0"/>
+              <a:t>As of recently, Python is the most popular programming language</a:t>
+            </a:r>
+          </a:p>
+        </p:txBody>
+      </p:sp>
+      <p:sp>
+        <p:nvSpPr>
+          <p:cNvPr id="4" name="Slide Number Placeholder 3"/>
+          <p:cNvSpPr>
+            <a:spLocks noGrp="1"/>
+          </p:cNvSpPr>
+          <p:nvPr>
+            <p:ph type="sldNum" sz="quarter" idx="12"/>
+          </p:nvPr>
+        </p:nvSpPr>
+        <p:spPr/>
+        <p:txBody>
+          <a:bodyPr/>
+          <a:lstStyle/>
+          <a:p>
+            <a:pPr>
+              <a:defRPr/>
+            </a:pPr>
+            <a:fld id="{B3B39CE4-1B0F-442B-AED0-7E4EF4FD7138}" type="slidenum">
+              <a:rPr lang="en-US" smtClean="0"/>
+              <a:pPr>
+                <a:defRPr/>
+              </a:pPr>
+              <a:t>28</a:t>
+            </a:fld>
+            <a:endParaRPr lang="en-US" dirty="0"/>
+          </a:p>
+        </p:txBody>
+      </p:sp>
+      <p:sp>
+        <p:nvSpPr>
+          <p:cNvPr id="5" name="AutoShape 2" descr="data:image/jpeg;base64,/9j/4AAQSkZJRgABAQAAAQABAAD/2wCEAAkGBxAPEBUPDxAQEBAPDxAQEA8PEBAQDw4PFREWFhUVFRUYHiggGBomHRYXITEhJSkrLi4uGB8zODMsNygtLisBCgoKDg0OGxAQFzIlHh8tListKy0tMS0tLS0tLS8tLi0tLS0vLSstLS0tLS0tLSstLS0wLS0tNzUtNzcrNy8tLv/AABEIAJ4BPwMBIgACEQEDEQH/xAAbAAACAwEBAQAAAAAAAAAAAAAAAQIEBQYDB//EAEMQAAEEAQMBBQMHCgUDBQAAAAEAAgMRBAUSITEGEyJBUTJhcRQVI4GRstEzUlNic4KSk6HBQkNUcrEHovAWY6Ph8f/EABkBAQEBAQEBAAAAAAAAAAAAAAABBAMCBf/EAC8RAAICAQIEBAUDBQAAAAAAAAABAhEDEiEEMUHwE1GR4SIyYYGxFEJiI0NSodH/2gAMAwEAAhEDEQA/APuKEIQAhCEAIQhACSaRQAkmkgEUJpKASCmkoUSSZQgEkmhCiKSaSgEkmkoASTSUKJJNCAikpJKAikpJKFEkmkoBJJpWEKAYSpdyfUJGVR71S0NxujPx+C8yp96k42psUghnVCbOqA2EIQtRxBCEIAQhCAEIQgEhBQgEkmUKASSaEKIpJpKAEk0kAkJpKFEkmkgEhMpKASSaShRJJpIBJKSShSKE0lAQkdQJ9FRdOvfUXVGT8P8AlYhn96zZZ06OkI2aJnS79Zpn96O/XHxDppNMTKbZllCf3qbZ/eqshNJsxutejOqpae+7+r+6us6rTB2rObVGuhCFsOAIQhACEIQAhCEAJJpFACSaRQAUk0lACRTSQokIKFAJJNBQokk0lAJJNCgEkmkoUSSaSASSkkoBJFNJQpXzot8bmjqWmviOQuNM67krj+1GnGN3fRj6N3tgf4HevwKx8XF1qXQ74WrplTv0d+sc5CXylfO8Q1aDaE69GzrEblLe0HTXzESOFRA3z/me4e73rpjbm6R4klFWzoNKiLYwT1f4vgPJXWdUJs6r6sVSSMbdmshCFrOIIQhACEIQAhCEAIQhAJCChAJBQhQCQhCFEUk0lAJCaSFEhMpKASSy4ceSW3meVtveA1pAa0BxAA49y9Pm1/8AqJv4m/guam3uonql5l9CofNr/wDUzfa38Ejpsn+pm/7PwU1S/wAfwKXmX1EmlROmyf6mb/s/BUs/Ela01kSurmjso1zR4XmWRpXp/B6UU+psd631XhmZrI2l3p6rEh1WM8FwBHUHghUdYzWTMMDHW5xF1zQXCfErTaPaxb7nSadqLZ2GSqYDV31I60vbHyWvBIPAJB+K4zE0zIa3YyTbH6bel9aW/h6RI1u0TvA61tZ1+xTFmyS/aWcIrqX58wDpR+KpS57zYLGOBFEG+QvX5kf+nd/BH+CkNFf+nP8ALj/Be34r6fg8rQupyc+jNJJbbbJpvUAelqo/Qz5O/ou2OiP/AE5/lsS+Y3/pv/iYsr4Nv9p2Wf6mLoXZ3HAD3u72Qc7Dw1p/2+f1rp6WPJAY3ljiHFoDg8DaaPlQV3Cyb4u/etGHTD4ao5zblvZbQ3qhNnVaDkaqEKMjw3r5kD6yaC0nIdrx+VN+qrJPG2zQsdRazNQztrbdQ8LgXPY9jQDI1vtCyDzx6qlLnfSBoJMjXlzQbc5he4xsDwzh0dWeTY4XCWZLY0w4aUlZvjI45FO4Lmgg7WkkWT6cL2Y8Hp5cLlflrW923Y+Nm8BjX7x+UL2uDjyHmxYB4pauBL+cSXVCHWS5wdt8w3wt+rhSGZN0XJw7irNdeQed5b5bA767IUo3X/8AlLyP5U/sh94rQZSwhcPg6zqUbAH40k8jy6y4BrY3hzfDwB4du43zyKtPO7TajC4Mdhs3Oe1jS0SuaXFhdxR5uq8tvnaA7dC4s9o9Uuvm4fl3M9skbBfn9hvolrGbq7oInQxNjm72Xvmx0WmMQF7K33/ipteddRaA7VC4sdodUsj5vBqZ7BTnDe0NcWmzwLIHPvUcXtFqr3MadPa3ewlznF4ax/ebRfurqPcgO2QuU0rVdRkyG97jtZAaZINrmmN/jJLST4qpoJ6GwQqseq6lGXnuJJnGcscx8bGxReJ20ROadzmkBniI43En0QHaoXHs1/UnUW4AFECRr3OaS7cAQw+nN2fRe+h6hnzZA76IxwGMk+HaN+1tcHkc2gOpQhCA8ioqRSXkpS0z2P35PvlXFS0z2P35PvlXLXPH8qPUuY0KG5G5etSJRJV8iOxS9tyRXl0yo5rP0ON5st5TwtFZGeG0uhLAgRhZv08Lujr4rqitDjgeStsbSKTtd4pI5t2TCahuRuXuzyTQkCherBzWvPqR59GN/us3QMovBN/4ir3aIHdIQCajbdc+qzez+K5jS3rtcQT+tfP9bXypt+L6muNaDrGOsA+5SZ1VfEdxSst6rdF2jgzUVLOl2tcQ7oK9oNa11W3c7yB4H1q6s7UQQd5LQG9Xv/JNbbbD23yTzR8l3yP4TzjScjEypDdNcG8vLiXzAsviVoe7w3u2ht+V0s3UtWjxoy6QiERvjm+kqOGJzjT4nOYfpHmya9Vbzxs3GUV4I9xnjdOSwTu8Jc00TyCBVhcT/wBRNzGQT+wzG1V78iRkNhhPsS7HGnAe/jlYYrVPS2fUm9GPUldd9+50Gha5jzOLIZWAR79zojIx8GOXAgmKQWbN80r+k9r8CR7Y4cmIFwmcIg55ETY7txqg1u0E8+a5LSdRxsnVGTt1KTNljxJWl8eHHFCI3dGPeDwb6WFk6Jpgk7PZboYw7IkdLucIy6ZzWz9A702g8BdvCjB8++130yPPPJG2u+33vf1LS+3ulzSjHjzI3SOdtjvftkPo17hTj8Cuj/zT+zb94r5HpHazRn4un4vyY5WQx8LG47IwZMeYcOkd6i+f6r64Pyp/Zt+8VqXIxvmUm6sdoLopLIshrSa9Aos1gkX3Et1YG08mul/0WnFM13LXNcASCWkGiOoU7VJyMyTVvzYZTQcTbSPZF0E36t0LYZXAuId4eW1V8efX+i0HyBoskAepNBDXAixVHmx0KAoO1Mgg93JsMe/2TvB3VVf+dUjrLQaMU11urZzVLRDwfTjrz0TtAZztUsO2RSW3oXtLWk7q+Neafzr/AOzMa60zi/ctC0WgM751H6Kb+Dp0/FeuLqAkO3u5G8E25tNv0VmOVrvZINEg0bojqFMFANCEIDyKSZSXkpR0z2P35PvlWyqWmnwfvyffKuLjD5Ue5cyKzu0ue/GwsnJjDS/HxZ5mB4JaXsjc4WBViwtFVNXwG5WPLjPLmsyIZIXObW5rZGFpIvi+VQcI/thmM0/5Y6WDc+fCiBk07Mx2QNmP0ji177mABFFtDg9bXth9s8uXHYI248s2VqT8HEygyWLFlja0udOYi4upu17du7kt6rbZ2SuFkE2blTxwzYk0IkbjNMRxnbmtBZGLBoA3Z8PFJZPYnHeJAJZ4zJnfOETonNa7Ey9tOdFx0dyS11jkr1tff09zzvXf19jWw2ZjYXiaTGkyPF3T2RyRQnwjbvYXOI5u6PSlxw7YZ0bM1jxi5D8bLxMPGyYmSR48mROWte17S5x+jLhdO93C62LSZBjSQPzMmR8wePlLjE2ePc3b9HsaGtqrHHWysfE7DRsxDguy8mSCo+5BbjRuxpGSCRsrHRxgl+4Akuu/Pqoq6l6Fc9oc9kOfGRivytMNmUNljgfC7HMwd3dk7h7O3cB52rGqavlt06PUGT40DW4TcjIEuNJNve6NrgI6lbt5JFG+oXueyDfk88PyvJ7zNeXZWURAZ52933ewgs2NbtoeFo6KZ7JsdiwYcuRPNFjTQygPEIMzYaMcUm1oBYCAfU0LKe3uPc09AlyH4sL8trG5D4mPmZGCGMe4XtAJPS66+SvoQowTaheb5KWdmansNDz/AKBSU1FblUWzH7QTyMyWiIOJcQPD1oNWjiDaPEA1x5PFWVWOoMDt4bbzxuPWlPvzMQy9pddHrXCxJrU3fPod3ySosYk4dIQ3o1vJ998K+zqvHExWxN2sHvJPVx9SvdvVaoJpbnKT8jTVPMbxwOvmCAS/o0UeD1/oriRC1NWjlF07OSnYWHvAdu3cSSIW950Y83u47x20g1xtVZ2M2R4adwcdkTZC7fP3LD4+9a+tzS4bbF3wuiycIXbW+yI+WiNgc0PJcCSOnmR9io5Wng7RtaSHubuoPDPF3kZc5/iJuuAasrDPEz6mPOmu+/8Apj6fhxxtt1DvGy7e8ijhhD99Rh8Y5LuDRW1p8LejGtY32i1rW13jhZdtNFt8iq814Q6ewU5sRYNu+nhpMW3lschNnlzi4EchauFjFtBwPh7sNJp/LWckP6nzFuTHjd79/c858ka27+yPTD0+FjjIyGNj3clwjja/nysBe/8Amn9m37xXsxlen1Lx/wA0/s2/eK3LkfNZhDR2ObujyOu8AcNYbNgAeQseSUGhNB3HI8DY6JY4NIcd19OjeennS0ToUXkXD4Vz093Hsj+qb9DiLHRguaJK3bdoJAN+nvWTwP4/7N/6nprfoil8xQ0QZrcNpslvhoOuh5DxH4UFW1LSGBoDJwDI4Nt76bdO54uzR46dArruzUQqi7hzS4miXtB6X7xx8CVI9mYDd7yHG6JBaOvAFdOR/CFHhbVaF6nqPERTvxH6Hnk6PG575BNtLn7y0Fo8QYAQT+6PgCfVQxtGYI2MfOSQS8lrqaS+Puxt+y/jyvSPszFTtxdb3SHh26gSQDZA5r7LI56q0NDi2sbbiI2bW9Pfz8fEVVid24L1PDzpKlkfp9DOOiRu+jGSdwa1tA9Swkm+f1ui9fmNnJOQ4l29zSSKG4jn3+zXvsq9JosbnOcS4F7nOsUCC6ro/UvKfs/C8MsvHdivCa3DdfP9ftKvg/wXqP1F/wBx+iKWRpEIBccjb9IHOoii4E8UD18X1cK3pODGyVzo5d5YwRPb1p3tWT6qMXZqFoIt5u6J2+GyORx1469Vd0vS2Y27YXHeQTuryFeQVhiaknpS+5MmZODSm39i8hCFqMJ5FJSKS8lM3TfY/fk++ValfTS6i4hpIaOrqHQe9VNNPg/fk++VYlaXNLQ4sJaQHiiWkjggHix71wh8p0fM4PC/6gSnBn1B8ONIIIw75LjSyuyseTcQY8lrmeCuLeBXB4W9ldsMeFsb54cyJsjYy578WQRwd5J3bRK7o0k+XPBF9QqMvYYz/KH5eWZp8rCdg99HjxY4ZEXB24taTvduA5J6cClV1v8A6eOzXB8+bueYYYnvOJE43FIXtdFZ+hB4Dg32q6rptZ43ov6326hx2ZZigyZ5NPDhKGwvEIeNtNMtEDh1+dAEkKMva5kUj5ZnSxQR6dHlPxZMUtmj3ZLo+8LrvyrZXTnzVyTsq18OfA6V23VJZZXEMAMHeQsjoc+Ktl3x1VDUuxDslsvfZhdJkadFgvkGO1oqPIdKJA0Or/Ftr3Xaiqu/Ir79S9D20xHtcQMgPZPDj9w/HkZkPknbui2xuo05oJs1wDdL2h7UwPwpdQDZmw44nLhJHskJhsPAaT+cC34grne23ZSWR0k8Imn+VZeDJNFAMfvIo8aCRgLBMdkluLTTqrrzS2OzOkyP004edE1jHtmhETRFG8YjiRGJBD4GybTZ28WnQdUVtJ7UZD5mR5TdPiMsTpnYseYX5+OzujI3dGWgP467aq75Ctwds8eTHblRwZ0kUhpmzDlLnjZuLwPzB03dL6WquH2MkbLDJNnSZDcSGeHHD4ImyBssfd/SyNNyENA8h0SzuwwlxMPF+UV83sDAX48c0U/0ezc6F5Ldw6tPO0+qOuhFfU9srt/gxta68iRr8RmaHQ48kgbiuJBkfQ8AFG7pWNL7UDIzpsJsEwbBHC9uTsd3UgkaXWTVNB42mzu56Us/G7BNZC6AZLiH6T817u6Fhu97u9rd18fs+7qtXTuz7sfKOSzIJZJjQQSwGJtPdA0tY8Pu28E23n4q7Dc1MlcprwcCHC+OvwXXShU8jFa7qFlz43NUjtjlpZxsWW0+YW7oDN79/wDhYKvyLj/9WsvN0qISkbfMdCR5D0XXYcDGMDY2hrasAe//AJWbh8bc9+h1ySVbdT1QzqhDeq+gZzTQhC0HIRFqBiF351X/AIF6IQHm2ECutjzs2ePP1UmtA6CvgpISi2CiGC93nVfVdqSEICEIQAhCEAIQhACEihANK0ihAStK1EoUAikmkoUy9P8AY/fk++VbVKAOjBa5jydzjbWOcCC4kchevf8A6kv8t/4LPF0qOr5li0bl4d/+rJ/Lf+CO/H5sn8t/4K6kSj3tFrw78ej/AOW/8Ejkt8w/+W/8E1IUWLRarfKm/rfwP/BHypv638D/AME1LzFFncjcq/ypnv8A4X/gvN+oRN4c8N/3WP8AlNS8xpZc3JFypfOkH6Vn2ps1GF3SRpr0N0prj5l0vyLRKRXj8sj/ADx/VQdqEPTvWA+m4I5R8xTMTUvyx+I+6Fu4Drjb8K+zhc7qM7XSktIcLHI5HQLc0d9x/BxWbC/6jOk18KLqG9UFNvVaziaKEIWg5ghCEAIQhACEIQAhCEAIQhACEIQAkmkUAJJpFACSaRUAJItJQoIQSkSgBFJWglCjpCSRKlglaLXmXKBkU1Cj3tczr3ilP6rWj+/91uOnAWLmlpcSbBcVm4iVxo641TswMhi3+xEVRySfnybR8GD8SVkZreDS3ezcrRjNA8i7d/uuysvDpLLfkdsr+A3ty4XtbFtyy7ykjY76x4T/AMBdf3y5jtYQ6WOuoY6/gXcf3Wji2pYznh2kZcC6vQPYd/u/sudxsf3rpNIbsBB86IWfhVUj3lexeIQ3qmUN6r6BnNBCELucwQhCAEIQgBCEIAQhCAEIQgBCEIAQhCASEFCASiVIopQpBCdIpQEUlOkqQpGkKVIpSgRpRcFMhRcEYPCRyqyzUrUjVWfDfouM76HtGFkauGyuaT5iufKl5T5zSLsLRy9Ehl5fGxx9SOftVT/0vj/mD4FzyPsKwyhlO6lA5/M1dgO1tvd6MFq9omY9jTuaW7nXXpwtiLRo2cNawD3L1+bx7l4jhyJ3Z7c41RWOpH0WFqupfSh7mkNIAvqBXqumOB8F5v0pruoaV6njySVWeYyimZ2BlNoEEG/NaHzkAqbuysR6FzP9j3NH2dE4uykQNl8jvcZHUpGOZckG4PqbuJkh7QfUK2w8qnjYYYAB0A9SrcbFvhqrc4Srof/Z"/>
+          <p:cNvSpPr>
+            <a:spLocks noChangeAspect="1" noChangeArrowheads="1"/>
+          </p:cNvSpPr>
+          <p:nvPr/>
+        </p:nvSpPr>
+        <p:spPr bwMode="auto">
+          <a:xfrm>
+            <a:off x="155575" y="-144463"/>
+            <a:ext cx="304800" cy="304801"/>
+          </a:xfrm>
+          <a:prstGeom prst="rect">
+            <a:avLst/>
+          </a:prstGeom>
+          <a:noFill/>
+          <a:extLst>
+            <a:ext uri="{909E8E84-426E-40DD-AFC4-6F175D3DCCD1}">
+              <a14:hiddenFill xmlns:a14="http://schemas.microsoft.com/office/drawing/2010/main">
+                <a:solidFill>
+                  <a:srgbClr val="FFFFFF"/>
+                </a:solidFill>
+              </a14:hiddenFill>
+            </a:ext>
+          </a:extLst>
+        </p:spPr>
+        <p:txBody>
+          <a:bodyPr vert="horz" wrap="square" lIns="91440" tIns="45720" rIns="91440" bIns="45720" numCol="1" anchor="t" anchorCtr="0" compatLnSpc="1">
+            <a:prstTxWarp prst="textNoShape">
+              <a:avLst/>
+            </a:prstTxWarp>
+          </a:bodyPr>
+          <a:lstStyle/>
+          <a:p>
+            <a:endParaRPr lang="en-US"/>
+          </a:p>
+        </p:txBody>
+      </p:sp>
+      <p:sp>
+        <p:nvSpPr>
+          <p:cNvPr id="8" name="TextBox 7"/>
+          <p:cNvSpPr txBox="1"/>
+          <p:nvPr/>
+        </p:nvSpPr>
+        <p:spPr>
+          <a:xfrm>
+            <a:off x="2873027" y="6458188"/>
+            <a:ext cx="3299173" cy="584775"/>
+          </a:xfrm>
+          <a:prstGeom prst="rect">
+            <a:avLst/>
+          </a:prstGeom>
+          <a:noFill/>
+        </p:spPr>
+        <p:txBody>
+          <a:bodyPr wrap="none" rtlCol="0">
+            <a:spAutoFit/>
+          </a:bodyPr>
+          <a:lstStyle/>
+          <a:p>
+            <a:r>
+              <a:rPr lang="en-GB" sz="1600" dirty="0">
+                <a:effectLst/>
+                <a:hlinkClick r:id="rId2"/>
+              </a:rPr>
+              <a:t>https://www.tiobe.com/tiobe-index</a:t>
+            </a:r>
+            <a:r>
+              <a:rPr lang="en-GB" sz="1600" dirty="0" smtClean="0">
+                <a:effectLst/>
+                <a:hlinkClick r:id="rId2"/>
+              </a:rPr>
+              <a:t>/</a:t>
+            </a:r>
+            <a:endParaRPr lang="en-GB" sz="1600" dirty="0" smtClean="0">
+              <a:effectLst/>
+            </a:endParaRPr>
+          </a:p>
+          <a:p>
+            <a:endParaRPr lang="en-GB" sz="1600" dirty="0" smtClean="0">
+              <a:effectLst/>
+            </a:endParaRPr>
+          </a:p>
+        </p:txBody>
+      </p:sp>
+      <p:pic>
+        <p:nvPicPr>
+          <p:cNvPr id="6" name="Picture 5"/>
+          <p:cNvPicPr>
+            <a:picLocks noChangeAspect="1"/>
+          </p:cNvPicPr>
+          <p:nvPr/>
+        </p:nvPicPr>
+        <p:blipFill>
+          <a:blip r:embed="rId3">
+            <a:extLst>
+              <a:ext uri="{28A0092B-C50C-407E-A947-70E740481C1C}">
+                <a14:useLocalDpi xmlns:a14="http://schemas.microsoft.com/office/drawing/2010/main" val="0"/>
+              </a:ext>
+            </a:extLst>
+          </a:blip>
+          <a:stretch>
+            <a:fillRect/>
+          </a:stretch>
+        </p:blipFill>
+        <p:spPr>
+          <a:xfrm>
+            <a:off x="426275" y="1752600"/>
+            <a:ext cx="8641525" cy="4629388"/>
+          </a:xfrm>
+          <a:prstGeom prst="rect">
+            <a:avLst/>
+          </a:prstGeom>
+        </p:spPr>
+      </p:pic>
+    </p:spTree>
+    <p:extLst>
+      <p:ext uri="{BB962C8B-B14F-4D97-AF65-F5344CB8AC3E}">
+        <p14:creationId xmlns:p14="http://schemas.microsoft.com/office/powerpoint/2010/main" val="1375396339"/>
+      </p:ext>
+    </p:extLst>
+  </p:cSld>
+  <p:clrMapOvr>
+    <a:masterClrMapping/>
+  </p:clrMapOvr>
+  <p:timing>
+    <p:tnLst>
+      <p:par>
+        <p:cTn id="1" dur="indefinite" restart="never" nodeType="tmRoot"/>
+      </p:par>
+    </p:tnLst>
+  </p:timing>
+</p:sld>
+</file>
+
+<file path=ppt/slides/slide29.xml><?xml version="1.0" encoding="utf-8"?>
 <p:sld xmlns:a="http://schemas.openxmlformats.org/drawingml/2006/main" xmlns:r="http://schemas.openxmlformats.org/officeDocument/2006/relationships" xmlns:p="http://schemas.openxmlformats.org/presentationml/2006/main">
   <p:cSld>
     <p:spTree>
@@ -10776,7 +10983,7 @@
               <a:pPr>
                 <a:defRPr/>
               </a:pPr>
-              <a:t>28</a:t>
+              <a:t>29</a:t>
             </a:fld>
             <a:endParaRPr lang="en-US" dirty="0"/>
           </a:p>
@@ -11099,186 +11306,6 @@
 </p:sld>
 </file>
 
-<file path=ppt/slides/slide29.xml><?xml version="1.0" encoding="utf-8"?>
-<p:sld xmlns:a="http://schemas.openxmlformats.org/drawingml/2006/main" xmlns:r="http://schemas.openxmlformats.org/officeDocument/2006/relationships" xmlns:p="http://schemas.openxmlformats.org/presentationml/2006/main">
-  <p:cSld>
-    <p:spTree>
-      <p:nvGrpSpPr>
-        <p:cNvPr id="1" name=""/>
-        <p:cNvGrpSpPr/>
-        <p:nvPr/>
-      </p:nvGrpSpPr>
-      <p:grpSpPr>
-        <a:xfrm>
-          <a:off x="0" y="0"/>
-          <a:ext cx="0" cy="0"/>
-          <a:chOff x="0" y="0"/>
-          <a:chExt cx="0" cy="0"/>
-        </a:xfrm>
-      </p:grpSpPr>
-      <p:sp>
-        <p:nvSpPr>
-          <p:cNvPr id="2" name="Title 1"/>
-          <p:cNvSpPr>
-            <a:spLocks noGrp="1"/>
-          </p:cNvSpPr>
-          <p:nvPr>
-            <p:ph type="title"/>
-          </p:nvPr>
-        </p:nvSpPr>
-        <p:spPr>
-          <a:xfrm>
-            <a:off x="228600" y="381000"/>
-            <a:ext cx="8686800" cy="1066800"/>
-          </a:xfrm>
-        </p:spPr>
-        <p:txBody>
-          <a:bodyPr>
-            <a:normAutofit/>
-          </a:bodyPr>
-          <a:lstStyle/>
-          <a:p>
-            <a:r>
-              <a:rPr lang="da-DK" sz="3200" b="1" dirty="0"/>
-              <a:t>Free advert (#3)</a:t>
-            </a:r>
-            <a:endParaRPr lang="en-US" sz="3200" dirty="0"/>
-          </a:p>
-        </p:txBody>
-      </p:sp>
-      <p:sp>
-        <p:nvSpPr>
-          <p:cNvPr id="3" name="Content Placeholder 2"/>
-          <p:cNvSpPr>
-            <a:spLocks noGrp="1"/>
-          </p:cNvSpPr>
-          <p:nvPr>
-            <p:ph idx="1"/>
-          </p:nvPr>
-        </p:nvSpPr>
-        <p:spPr>
-          <a:xfrm>
-            <a:off x="304800" y="1371600"/>
-            <a:ext cx="8686800" cy="1295399"/>
-          </a:xfrm>
-        </p:spPr>
-        <p:txBody>
-          <a:bodyPr>
-            <a:normAutofit/>
-          </a:bodyPr>
-          <a:lstStyle/>
-          <a:p>
-            <a:r>
-              <a:rPr lang="da-DK" dirty="0" smtClean="0"/>
-              <a:t>This is the typical heavy-ion event at Large Hadron Collider reconstructed by ALICE Collaboration</a:t>
-            </a:r>
-            <a:endParaRPr lang="en-US" dirty="0" smtClean="0"/>
-          </a:p>
-        </p:txBody>
-      </p:sp>
-      <p:sp>
-        <p:nvSpPr>
-          <p:cNvPr id="4" name="Slide Number Placeholder 3"/>
-          <p:cNvSpPr>
-            <a:spLocks noGrp="1"/>
-          </p:cNvSpPr>
-          <p:nvPr>
-            <p:ph type="sldNum" sz="quarter" idx="12"/>
-          </p:nvPr>
-        </p:nvSpPr>
-        <p:spPr/>
-        <p:txBody>
-          <a:bodyPr/>
-          <a:lstStyle/>
-          <a:p>
-            <a:pPr>
-              <a:defRPr/>
-            </a:pPr>
-            <a:fld id="{B3B39CE4-1B0F-442B-AED0-7E4EF4FD7138}" type="slidenum">
-              <a:rPr lang="en-US" smtClean="0"/>
-              <a:pPr>
-                <a:defRPr/>
-              </a:pPr>
-              <a:t>29</a:t>
-            </a:fld>
-            <a:endParaRPr lang="en-US" dirty="0"/>
-          </a:p>
-        </p:txBody>
-      </p:sp>
-      <p:pic>
-        <p:nvPicPr>
-          <p:cNvPr id="6" name="Picture 2" descr="realHI"/>
-          <p:cNvPicPr>
-            <a:picLocks noChangeAspect="1" noChangeArrowheads="1"/>
-          </p:cNvPicPr>
-          <p:nvPr/>
-        </p:nvPicPr>
-        <p:blipFill>
-          <a:blip r:embed="rId2" cstate="print">
-            <a:extLst>
-              <a:ext uri="{28A0092B-C50C-407E-A947-70E740481C1C}">
-                <a14:useLocalDpi xmlns:a14="http://schemas.microsoft.com/office/drawing/2010/main" val="0"/>
-              </a:ext>
-            </a:extLst>
-          </a:blip>
-          <a:srcRect/>
-          <a:stretch>
-            <a:fillRect/>
-          </a:stretch>
-        </p:blipFill>
-        <p:spPr bwMode="auto">
-          <a:xfrm>
-            <a:off x="1600200" y="2286000"/>
-            <a:ext cx="5955100" cy="4383617"/>
-          </a:xfrm>
-          <a:prstGeom prst="rect">
-            <a:avLst/>
-          </a:prstGeom>
-          <a:noFill/>
-          <a:ln>
-            <a:noFill/>
-          </a:ln>
-          <a:extLst>
-            <a:ext uri="{909E8E84-426E-40DD-AFC4-6F175D3DCCD1}">
-              <a14:hiddenFill xmlns:a14="http://schemas.microsoft.com/office/drawing/2010/main">
-                <a:solidFill>
-                  <a:srgbClr val="FFFFFF"/>
-                </a:solidFill>
-              </a14:hiddenFill>
-            </a:ext>
-            <a:ext uri="{91240B29-F687-4F45-9708-019B960494DF}">
-              <a14:hiddenLine xmlns:a14="http://schemas.microsoft.com/office/drawing/2010/main" w="9525">
-                <a:solidFill>
-                  <a:srgbClr val="000000"/>
-                </a:solidFill>
-                <a:miter lim="800000"/>
-                <a:headEnd/>
-                <a:tailEnd/>
-              </a14:hiddenLine>
-            </a:ext>
-          </a:extLst>
-        </p:spPr>
-      </p:pic>
-    </p:spTree>
-    <p:extLst>
-      <p:ext uri="{BB962C8B-B14F-4D97-AF65-F5344CB8AC3E}">
-        <p14:creationId xmlns:p14="http://schemas.microsoft.com/office/powerpoint/2010/main" val="2354057611"/>
-      </p:ext>
-    </p:extLst>
-  </p:cSld>
-  <p:clrMapOvr>
-    <a:masterClrMapping/>
-  </p:clrMapOvr>
-  <p:timing>
-    <p:tnLst>
-      <p:par>
-        <p:cTn id="1" dur="indefinite" restart="never" nodeType="tmRoot"/>
-      </p:par>
-    </p:tnLst>
-  </p:timing>
-</p:sld>
-</file>
-
 <file path=ppt/slides/slide3.xml><?xml version="1.0" encoding="utf-8"?>
 <p:sld xmlns:a="http://schemas.openxmlformats.org/drawingml/2006/main" xmlns:r="http://schemas.openxmlformats.org/officeDocument/2006/relationships" xmlns:p="http://schemas.openxmlformats.org/presentationml/2006/main">
   <p:cSld>
@@ -12325,7 +12352,7 @@
         <p:spPr>
           <a:xfrm>
             <a:off x="304800" y="1371600"/>
-            <a:ext cx="8686800" cy="3581400"/>
+            <a:ext cx="8686800" cy="1295399"/>
           </a:xfrm>
         </p:spPr>
         <p:txBody>
@@ -12336,20 +12363,7 @@
           <a:p>
             <a:r>
               <a:rPr lang="da-DK" dirty="0" smtClean="0"/>
-              <a:t>Trajectories of more than 10000 particles are reconstructed by AliROOT (C++ code specific to ALICE Collaboration built on top of ROOT)</a:t>
-            </a:r>
-          </a:p>
-          <a:p>
-            <a:r>
-              <a:rPr lang="da-DK" dirty="0" smtClean="0"/>
-              <a:t>Most important major collaborations worldwide in high-energy physics currently use ROOT </a:t>
-            </a:r>
-          </a:p>
-          <a:p>
-            <a:pPr lvl="1"/>
-            <a:r>
-              <a:rPr lang="en-GB" dirty="0" smtClean="0"/>
-              <a:t>Also the future ones (e.g. CBM at GSI, which will start data taking in 2025, is developing CbmRoot) </a:t>
+              <a:t>This is the typical heavy-ion event at Large Hadron Collider reconstructed by ALICE Collaboration</a:t>
             </a:r>
             <a:endParaRPr lang="en-US" dirty="0" smtClean="0"/>
           </a:p>
@@ -12384,10 +12398,64 @@
           </a:p>
         </p:txBody>
       </p:sp>
+      <p:pic>
+        <p:nvPicPr>
+          <p:cNvPr id="6" name="Picture 2" descr="realHI"/>
+          <p:cNvPicPr>
+            <a:picLocks noChangeAspect="1" noChangeArrowheads="1"/>
+          </p:cNvPicPr>
+          <p:nvPr/>
+        </p:nvPicPr>
+        <p:blipFill>
+          <a:blip r:embed="rId2" cstate="print">
+            <a:extLst>
+              <a:ext uri="{28A0092B-C50C-407E-A947-70E740481C1C}">
+                <a14:useLocalDpi xmlns:a14="http://schemas.microsoft.com/office/drawing/2010/main" val="0"/>
+              </a:ext>
+            </a:extLst>
+          </a:blip>
+          <a:srcRect/>
+          <a:stretch>
+            <a:fillRect/>
+          </a:stretch>
+        </p:blipFill>
+        <p:spPr bwMode="auto">
+          <a:xfrm>
+            <a:off x="1600200" y="2286000"/>
+            <a:ext cx="5955100" cy="4383617"/>
+          </a:xfrm>
+          <a:prstGeom prst="rect">
+            <a:avLst/>
+          </a:prstGeom>
+          <a:noFill/>
+          <a:ln>
+            <a:noFill/>
+          </a:ln>
+          <a:extLst>
+            <a:ext uri="{909E8E84-426E-40DD-AFC4-6F175D3DCCD1}">
+              <a14:hiddenFill xmlns:a14="http://schemas.microsoft.com/office/drawing/2010/main">
+                <a:solidFill>
+                  <a:srgbClr val="FFFFFF"/>
+                </a:solidFill>
+              </a14:hiddenFill>
+            </a:ext>
+            <a:ext uri="{91240B29-F687-4F45-9708-019B960494DF}">
+              <a14:hiddenLine xmlns:a14="http://schemas.microsoft.com/office/drawing/2010/main" w="9525">
+                <a:solidFill>
+                  <a:srgbClr val="000000"/>
+                </a:solidFill>
+                <a:miter lim="800000"/>
+                <a:headEnd/>
+                <a:tailEnd/>
+              </a14:hiddenLine>
+            </a:ext>
+          </a:extLst>
+        </p:spPr>
+      </p:pic>
     </p:spTree>
     <p:extLst>
       <p:ext uri="{BB962C8B-B14F-4D97-AF65-F5344CB8AC3E}">
-        <p14:creationId xmlns:p14="http://schemas.microsoft.com/office/powerpoint/2010/main" val="2036440008"/>
+        <p14:creationId xmlns:p14="http://schemas.microsoft.com/office/powerpoint/2010/main" val="2354057611"/>
       </p:ext>
     </p:extLst>
   </p:cSld>
@@ -12445,11 +12513,7 @@
           <a:p>
             <a:r>
               <a:rPr lang="da-DK" sz="3200" b="1" dirty="0"/>
-              <a:t>Free advert </a:t>
-            </a:r>
-            <a:r>
-              <a:rPr lang="da-DK" sz="3200" b="1" dirty="0" smtClean="0"/>
-              <a:t>(#4)</a:t>
+              <a:t>Free advert (#3)</a:t>
             </a:r>
             <a:endParaRPr lang="en-US" sz="3200" dirty="0"/>
           </a:p>
@@ -12468,7 +12532,7 @@
         <p:spPr>
           <a:xfrm>
             <a:off x="304800" y="1371600"/>
-            <a:ext cx="8686800" cy="1295399"/>
+            <a:ext cx="8686800" cy="3581400"/>
           </a:xfrm>
         </p:spPr>
         <p:txBody>
@@ -12479,7 +12543,20 @@
           <a:p>
             <a:r>
               <a:rPr lang="da-DK" dirty="0" smtClean="0"/>
-              <a:t>In terms of histogramming quality and performance, it’s difficult to beat ROOT...</a:t>
+              <a:t>Trajectories of more than 10000 particles are reconstructed by AliROOT (C++ code specific to ALICE Collaboration built on top of ROOT)</a:t>
+            </a:r>
+          </a:p>
+          <a:p>
+            <a:r>
+              <a:rPr lang="da-DK" dirty="0" smtClean="0"/>
+              <a:t>Most important major collaborations worldwide in high-energy physics currently use ROOT </a:t>
+            </a:r>
+          </a:p>
+          <a:p>
+            <a:pPr lvl="1"/>
+            <a:r>
+              <a:rPr lang="en-GB" dirty="0" smtClean="0"/>
+              <a:t>Also the future ones (e.g. CBM at GSI, which will start data taking in 2025, is developing CbmRoot) </a:t>
             </a:r>
             <a:endParaRPr lang="en-US" dirty="0" smtClean="0"/>
           </a:p>
@@ -12514,64 +12591,10 @@
           </a:p>
         </p:txBody>
       </p:sp>
-      <p:pic>
-        <p:nvPicPr>
-          <p:cNvPr id="41986" name="Picture 2"/>
-          <p:cNvPicPr>
-            <a:picLocks noChangeAspect="1" noChangeArrowheads="1"/>
-          </p:cNvPicPr>
-          <p:nvPr/>
-        </p:nvPicPr>
-        <p:blipFill>
-          <a:blip r:embed="rId2">
-            <a:extLst>
-              <a:ext uri="{28A0092B-C50C-407E-A947-70E740481C1C}">
-                <a14:useLocalDpi xmlns:a14="http://schemas.microsoft.com/office/drawing/2010/main" val="0"/>
-              </a:ext>
-            </a:extLst>
-          </a:blip>
-          <a:srcRect/>
-          <a:stretch>
-            <a:fillRect/>
-          </a:stretch>
-        </p:blipFill>
-        <p:spPr bwMode="auto">
-          <a:xfrm>
-            <a:off x="1066800" y="2470562"/>
-            <a:ext cx="6905625" cy="3930238"/>
-          </a:xfrm>
-          <a:prstGeom prst="rect">
-            <a:avLst/>
-          </a:prstGeom>
-          <a:noFill/>
-          <a:ln>
-            <a:noFill/>
-          </a:ln>
-          <a:extLst>
-            <a:ext uri="{909E8E84-426E-40DD-AFC4-6F175D3DCCD1}">
-              <a14:hiddenFill xmlns:a14="http://schemas.microsoft.com/office/drawing/2010/main">
-                <a:solidFill>
-                  <a:schemeClr val="accent1"/>
-                </a:solidFill>
-              </a14:hiddenFill>
-            </a:ext>
-            <a:ext uri="{91240B29-F687-4F45-9708-019B960494DF}">
-              <a14:hiddenLine xmlns:a14="http://schemas.microsoft.com/office/drawing/2010/main" w="9525">
-                <a:solidFill>
-                  <a:schemeClr val="tx1"/>
-                </a:solidFill>
-                <a:miter lim="800000"/>
-                <a:headEnd/>
-                <a:tailEnd/>
-              </a14:hiddenLine>
-            </a:ext>
-          </a:extLst>
-        </p:spPr>
-      </p:pic>
     </p:spTree>
     <p:extLst>
       <p:ext uri="{BB962C8B-B14F-4D97-AF65-F5344CB8AC3E}">
-        <p14:creationId xmlns:p14="http://schemas.microsoft.com/office/powerpoint/2010/main" val="3267303927"/>
+        <p14:creationId xmlns:p14="http://schemas.microsoft.com/office/powerpoint/2010/main" val="2036440008"/>
       </p:ext>
     </p:extLst>
   </p:cSld>
@@ -12628,8 +12651,12 @@
           <a:lstStyle/>
           <a:p>
             <a:r>
+              <a:rPr lang="da-DK" sz="3200" b="1" dirty="0"/>
+              <a:t>Free advert </a:t>
+            </a:r>
+            <a:r>
               <a:rPr lang="da-DK" sz="3200" b="1" dirty="0" smtClean="0"/>
-              <a:t>ROOT</a:t>
+              <a:t>(#4)</a:t>
             </a:r>
             <a:endParaRPr lang="en-US" sz="3200" dirty="0"/>
           </a:p>
@@ -12648,154 +12675,19 @@
         <p:spPr>
           <a:xfrm>
             <a:off x="304800" y="1371600"/>
-            <a:ext cx="8686800" cy="3124200"/>
+            <a:ext cx="8686800" cy="1295399"/>
           </a:xfrm>
         </p:spPr>
         <p:txBody>
           <a:bodyPr>
-            <a:normAutofit lnSpcReduction="10000"/>
+            <a:normAutofit/>
           </a:bodyPr>
           <a:lstStyle/>
           <a:p>
             <a:r>
-              <a:rPr lang="en-GB" dirty="0" smtClean="0"/>
-              <a:t>Object-oriented framework, written in </a:t>
-            </a:r>
-            <a:r>
-              <a:rPr lang="en-GB" dirty="0"/>
-              <a:t>C++ and developed at </a:t>
-            </a:r>
-            <a:r>
-              <a:rPr lang="en-GB" dirty="0" smtClean="0"/>
-              <a:t>CERN, </a:t>
-            </a:r>
-            <a:r>
-              <a:rPr lang="en-GB" dirty="0"/>
-              <a:t>for data analysis in high-energy </a:t>
-            </a:r>
-            <a:r>
-              <a:rPr lang="en-GB" dirty="0" smtClean="0"/>
-              <a:t>physics</a:t>
-            </a:r>
-          </a:p>
-          <a:p>
-            <a:r>
-              <a:rPr lang="en-GB" dirty="0" smtClean="0"/>
-              <a:t>The </a:t>
-            </a:r>
-            <a:r>
-              <a:rPr lang="en-GB" dirty="0"/>
-              <a:t>development was initiated by René </a:t>
-            </a:r>
-            <a:r>
-              <a:rPr lang="en-GB" dirty="0" err="1"/>
-              <a:t>Brun</a:t>
-            </a:r>
-            <a:r>
-              <a:rPr lang="en-GB" dirty="0"/>
-              <a:t> and </a:t>
-            </a:r>
-            <a:r>
-              <a:rPr lang="en-GB" dirty="0" err="1"/>
-              <a:t>Fons</a:t>
-            </a:r>
-            <a:r>
-              <a:rPr lang="en-GB" dirty="0"/>
-              <a:t> </a:t>
-            </a:r>
-            <a:r>
-              <a:rPr lang="en-GB" dirty="0" err="1"/>
-              <a:t>Rademakers</a:t>
-            </a:r>
-            <a:r>
-              <a:rPr lang="en-GB" dirty="0"/>
-              <a:t> in </a:t>
-            </a:r>
-            <a:r>
-              <a:rPr lang="en-GB" dirty="0" smtClean="0"/>
-              <a:t>1994, and is still under active development</a:t>
-            </a:r>
-          </a:p>
-          <a:p>
-            <a:pPr lvl="1"/>
-            <a:r>
-              <a:rPr lang="en-GB" dirty="0" smtClean="0"/>
-              <a:t>Latest release</a:t>
-            </a:r>
-            <a:r>
-              <a:rPr lang="en-GB" dirty="0"/>
-              <a:t>: Version </a:t>
-            </a:r>
-            <a:r>
-              <a:rPr lang="en-GB" dirty="0" smtClean="0"/>
-              <a:t>6.26/00 (March 3, 2022)</a:t>
-            </a:r>
-            <a:endParaRPr lang="en-GB" dirty="0" smtClean="0"/>
-          </a:p>
-          <a:p>
-            <a:r>
-              <a:rPr lang="en-GB" dirty="0" smtClean="0"/>
-              <a:t>Webpage: </a:t>
-            </a:r>
-            <a:r>
-              <a:rPr lang="en-US" sz="1800" dirty="0">
-                <a:hlinkClick r:id="rId2"/>
-              </a:rPr>
-              <a:t>https://root.cern.ch</a:t>
-            </a:r>
-            <a:r>
-              <a:rPr lang="en-US" sz="1800" dirty="0" smtClean="0">
-                <a:hlinkClick r:id="rId2"/>
-              </a:rPr>
-              <a:t>/</a:t>
-            </a:r>
-            <a:r>
-              <a:rPr lang="en-US" sz="1800" dirty="0" smtClean="0"/>
-              <a:t> </a:t>
-            </a:r>
-          </a:p>
-          <a:p>
-            <a:r>
-              <a:rPr lang="en-GB" dirty="0" smtClean="0"/>
-              <a:t>Root forum: </a:t>
-            </a:r>
-            <a:r>
-              <a:rPr lang="en-US" sz="1800" dirty="0">
-                <a:hlinkClick r:id="rId3"/>
-              </a:rPr>
-              <a:t>https://root-forum.cern.ch</a:t>
-            </a:r>
-            <a:r>
-              <a:rPr lang="en-US" sz="1800" dirty="0" smtClean="0">
-                <a:hlinkClick r:id="rId3"/>
-              </a:rPr>
-              <a:t>/</a:t>
-            </a:r>
-            <a:endParaRPr lang="en-US" sz="1800" dirty="0" smtClean="0"/>
-          </a:p>
-          <a:p>
-            <a:r>
-              <a:rPr lang="en-US" dirty="0"/>
-              <a:t>Source code: </a:t>
-            </a:r>
-            <a:r>
-              <a:rPr lang="en-US" sz="1800" dirty="0">
-                <a:hlinkClick r:id="rId4"/>
-              </a:rPr>
-              <a:t>https://</a:t>
-            </a:r>
-            <a:r>
-              <a:rPr lang="en-US" sz="1800" dirty="0" smtClean="0">
-                <a:hlinkClick r:id="rId4"/>
-              </a:rPr>
-              <a:t>github.com/root-project/root</a:t>
-            </a:r>
-            <a:endParaRPr lang="en-US" sz="1800" dirty="0" smtClean="0"/>
-          </a:p>
-          <a:p>
-            <a:endParaRPr lang="en-US" dirty="0" smtClean="0"/>
-          </a:p>
-          <a:p>
+              <a:rPr lang="da-DK" dirty="0" smtClean="0"/>
+              <a:t>In terms of histogramming quality and performance, it’s difficult to beat ROOT...</a:t>
+            </a:r>
             <a:endParaRPr lang="en-US" dirty="0" smtClean="0"/>
           </a:p>
         </p:txBody>
@@ -12831,14 +12723,14 @@
       </p:sp>
       <p:pic>
         <p:nvPicPr>
-          <p:cNvPr id="5122" name="Picture 2" descr="https://root.cern.ch/img/logos/ROOT_Logo/misc/logo_full-plus-text-hor.png"/>
+          <p:cNvPr id="41986" name="Picture 2"/>
           <p:cNvPicPr>
             <a:picLocks noChangeAspect="1" noChangeArrowheads="1"/>
           </p:cNvPicPr>
           <p:nvPr/>
         </p:nvPicPr>
         <p:blipFill>
-          <a:blip r:embed="rId5">
+          <a:blip r:embed="rId2">
             <a:extLst>
               <a:ext uri="{28A0092B-C50C-407E-A947-70E740481C1C}">
                 <a14:useLocalDpi xmlns:a14="http://schemas.microsoft.com/office/drawing/2010/main" val="0"/>
@@ -12852,20 +12744,33 @@
         </p:blipFill>
         <p:spPr bwMode="auto">
           <a:xfrm>
-            <a:off x="1143000" y="4343400"/>
-            <a:ext cx="6626225" cy="2264823"/>
+            <a:off x="1066800" y="2470562"/>
+            <a:ext cx="6905625" cy="3930238"/>
           </a:xfrm>
           <a:prstGeom prst="rect">
             <a:avLst/>
           </a:prstGeom>
           <a:noFill/>
+          <a:ln>
+            <a:noFill/>
+          </a:ln>
           <a:extLst>
             <a:ext uri="{909E8E84-426E-40DD-AFC4-6F175D3DCCD1}">
               <a14:hiddenFill xmlns:a14="http://schemas.microsoft.com/office/drawing/2010/main">
                 <a:solidFill>
-                  <a:srgbClr val="FFFFFF"/>
+                  <a:schemeClr val="accent1"/>
                 </a:solidFill>
               </a14:hiddenFill>
+            </a:ext>
+            <a:ext uri="{91240B29-F687-4F45-9708-019B960494DF}">
+              <a14:hiddenLine xmlns:a14="http://schemas.microsoft.com/office/drawing/2010/main" w="9525">
+                <a:solidFill>
+                  <a:schemeClr val="tx1"/>
+                </a:solidFill>
+                <a:miter lim="800000"/>
+                <a:headEnd/>
+                <a:tailEnd/>
+              </a14:hiddenLine>
             </a:ext>
           </a:extLst>
         </p:spPr>
@@ -12873,7 +12778,7 @@
     </p:spTree>
     <p:extLst>
       <p:ext uri="{BB962C8B-B14F-4D97-AF65-F5344CB8AC3E}">
-        <p14:creationId xmlns:p14="http://schemas.microsoft.com/office/powerpoint/2010/main" val="2747857359"/>
+        <p14:creationId xmlns:p14="http://schemas.microsoft.com/office/powerpoint/2010/main" val="3267303927"/>
       </p:ext>
     </p:extLst>
   </p:cSld>
@@ -12919,22 +12824,185 @@
         </p:nvSpPr>
         <p:spPr>
           <a:xfrm>
-            <a:off x="152400" y="2895600"/>
-            <a:ext cx="8839200" cy="838200"/>
+            <a:off x="228600" y="381000"/>
+            <a:ext cx="8686800" cy="1066800"/>
           </a:xfrm>
         </p:spPr>
         <p:txBody>
           <a:bodyPr>
-            <a:noAutofit/>
+            <a:normAutofit/>
           </a:bodyPr>
           <a:lstStyle/>
           <a:p>
-            <a:pPr algn="ctr"/>
-            <a:r>
-              <a:rPr lang="da-DK" b="1" dirty="0" smtClean="0"/>
-              <a:t>Thanks!</a:t>
-            </a:r>
-            <a:endParaRPr lang="en-US" dirty="0"/>
+            <a:r>
+              <a:rPr lang="da-DK" sz="3200" b="1" dirty="0" smtClean="0"/>
+              <a:t>ROOT</a:t>
+            </a:r>
+            <a:endParaRPr lang="en-US" sz="3200" dirty="0"/>
+          </a:p>
+        </p:txBody>
+      </p:sp>
+      <p:sp>
+        <p:nvSpPr>
+          <p:cNvPr id="3" name="Content Placeholder 2"/>
+          <p:cNvSpPr>
+            <a:spLocks noGrp="1"/>
+          </p:cNvSpPr>
+          <p:nvPr>
+            <p:ph idx="1"/>
+          </p:nvPr>
+        </p:nvSpPr>
+        <p:spPr>
+          <a:xfrm>
+            <a:off x="304800" y="1371600"/>
+            <a:ext cx="8686800" cy="3124200"/>
+          </a:xfrm>
+        </p:spPr>
+        <p:txBody>
+          <a:bodyPr>
+            <a:normAutofit lnSpcReduction="10000"/>
+          </a:bodyPr>
+          <a:lstStyle/>
+          <a:p>
+            <a:r>
+              <a:rPr lang="en-GB" dirty="0" smtClean="0"/>
+              <a:t>Object-oriented framework, written in </a:t>
+            </a:r>
+            <a:r>
+              <a:rPr lang="en-GB" dirty="0"/>
+              <a:t>C++ and developed at </a:t>
+            </a:r>
+            <a:r>
+              <a:rPr lang="en-GB" dirty="0" smtClean="0"/>
+              <a:t>CERN, </a:t>
+            </a:r>
+            <a:r>
+              <a:rPr lang="en-GB" dirty="0"/>
+              <a:t>for data analysis in high-energy </a:t>
+            </a:r>
+            <a:r>
+              <a:rPr lang="en-GB" dirty="0" smtClean="0"/>
+              <a:t>physics</a:t>
+            </a:r>
+          </a:p>
+          <a:p>
+            <a:r>
+              <a:rPr lang="en-GB" dirty="0" smtClean="0"/>
+              <a:t>The </a:t>
+            </a:r>
+            <a:r>
+              <a:rPr lang="en-GB" dirty="0"/>
+              <a:t>development was initiated by René </a:t>
+            </a:r>
+            <a:r>
+              <a:rPr lang="en-GB" dirty="0" err="1"/>
+              <a:t>Brun</a:t>
+            </a:r>
+            <a:r>
+              <a:rPr lang="en-GB" dirty="0"/>
+              <a:t> and </a:t>
+            </a:r>
+            <a:r>
+              <a:rPr lang="en-GB" dirty="0" err="1"/>
+              <a:t>Fons</a:t>
+            </a:r>
+            <a:r>
+              <a:rPr lang="en-GB" dirty="0"/>
+              <a:t> </a:t>
+            </a:r>
+            <a:r>
+              <a:rPr lang="en-GB" dirty="0" err="1"/>
+              <a:t>Rademakers</a:t>
+            </a:r>
+            <a:r>
+              <a:rPr lang="en-GB" dirty="0"/>
+              <a:t> in </a:t>
+            </a:r>
+            <a:r>
+              <a:rPr lang="en-GB" dirty="0" smtClean="0"/>
+              <a:t>1994, and is still under active development</a:t>
+            </a:r>
+          </a:p>
+          <a:p>
+            <a:pPr lvl="1"/>
+            <a:r>
+              <a:rPr lang="en-GB" dirty="0" smtClean="0"/>
+              <a:t>Latest release</a:t>
+            </a:r>
+            <a:r>
+              <a:rPr lang="en-GB" dirty="0"/>
+              <a:t>: Version </a:t>
+            </a:r>
+            <a:r>
+              <a:rPr lang="en-GB" dirty="0" smtClean="0"/>
+              <a:t>6.26/00 (March 3, 2022)</a:t>
+            </a:r>
+          </a:p>
+          <a:p>
+            <a:r>
+              <a:rPr lang="en-GB" dirty="0" smtClean="0"/>
+              <a:t>Webpage: </a:t>
+            </a:r>
+            <a:r>
+              <a:rPr lang="en-US" sz="1800" dirty="0">
+                <a:hlinkClick r:id="rId2"/>
+              </a:rPr>
+              <a:t>https://root.cern.ch</a:t>
+            </a:r>
+            <a:r>
+              <a:rPr lang="en-US" sz="1800" dirty="0" smtClean="0">
+                <a:hlinkClick r:id="rId2"/>
+              </a:rPr>
+              <a:t>/</a:t>
+            </a:r>
+            <a:r>
+              <a:rPr lang="en-US" sz="1800" dirty="0" smtClean="0"/>
+              <a:t> </a:t>
+            </a:r>
+          </a:p>
+          <a:p>
+            <a:r>
+              <a:rPr lang="en-GB" dirty="0" smtClean="0"/>
+              <a:t>Root forum: </a:t>
+            </a:r>
+            <a:r>
+              <a:rPr lang="en-US" sz="1800" dirty="0">
+                <a:hlinkClick r:id="rId3"/>
+              </a:rPr>
+              <a:t>https://root-forum.cern.ch</a:t>
+            </a:r>
+            <a:r>
+              <a:rPr lang="en-US" sz="1800" dirty="0" smtClean="0">
+                <a:hlinkClick r:id="rId3"/>
+              </a:rPr>
+              <a:t>/</a:t>
+            </a:r>
+            <a:endParaRPr lang="en-US" sz="1800" dirty="0" smtClean="0"/>
+          </a:p>
+          <a:p>
+            <a:r>
+              <a:rPr lang="en-US" dirty="0"/>
+              <a:t>Source code: </a:t>
+            </a:r>
+            <a:r>
+              <a:rPr lang="en-US" sz="1800" dirty="0">
+                <a:hlinkClick r:id="rId4"/>
+              </a:rPr>
+              <a:t>https://</a:t>
+            </a:r>
+            <a:r>
+              <a:rPr lang="en-US" sz="1800" dirty="0" smtClean="0">
+                <a:hlinkClick r:id="rId4"/>
+              </a:rPr>
+              <a:t>github.com/root-project/root</a:t>
+            </a:r>
+            <a:endParaRPr lang="en-US" sz="1800" dirty="0" smtClean="0"/>
+          </a:p>
+          <a:p>
+            <a:endParaRPr lang="en-US" dirty="0" smtClean="0"/>
+          </a:p>
+          <a:p>
+            <a:endParaRPr lang="en-US" dirty="0" smtClean="0"/>
           </a:p>
         </p:txBody>
       </p:sp>
@@ -12962,6 +13030,144 @@
                 <a:defRPr/>
               </a:pPr>
               <a:t>33</a:t>
+            </a:fld>
+            <a:endParaRPr lang="en-US" dirty="0"/>
+          </a:p>
+        </p:txBody>
+      </p:sp>
+      <p:pic>
+        <p:nvPicPr>
+          <p:cNvPr id="5122" name="Picture 2" descr="https://root.cern.ch/img/logos/ROOT_Logo/misc/logo_full-plus-text-hor.png"/>
+          <p:cNvPicPr>
+            <a:picLocks noChangeAspect="1" noChangeArrowheads="1"/>
+          </p:cNvPicPr>
+          <p:nvPr/>
+        </p:nvPicPr>
+        <p:blipFill>
+          <a:blip r:embed="rId5">
+            <a:extLst>
+              <a:ext uri="{28A0092B-C50C-407E-A947-70E740481C1C}">
+                <a14:useLocalDpi xmlns:a14="http://schemas.microsoft.com/office/drawing/2010/main" val="0"/>
+              </a:ext>
+            </a:extLst>
+          </a:blip>
+          <a:srcRect/>
+          <a:stretch>
+            <a:fillRect/>
+          </a:stretch>
+        </p:blipFill>
+        <p:spPr bwMode="auto">
+          <a:xfrm>
+            <a:off x="1143000" y="4343400"/>
+            <a:ext cx="6626225" cy="2264823"/>
+          </a:xfrm>
+          <a:prstGeom prst="rect">
+            <a:avLst/>
+          </a:prstGeom>
+          <a:noFill/>
+          <a:extLst>
+            <a:ext uri="{909E8E84-426E-40DD-AFC4-6F175D3DCCD1}">
+              <a14:hiddenFill xmlns:a14="http://schemas.microsoft.com/office/drawing/2010/main">
+                <a:solidFill>
+                  <a:srgbClr val="FFFFFF"/>
+                </a:solidFill>
+              </a14:hiddenFill>
+            </a:ext>
+          </a:extLst>
+        </p:spPr>
+      </p:pic>
+    </p:spTree>
+    <p:extLst>
+      <p:ext uri="{BB962C8B-B14F-4D97-AF65-F5344CB8AC3E}">
+        <p14:creationId xmlns:p14="http://schemas.microsoft.com/office/powerpoint/2010/main" val="2747857359"/>
+      </p:ext>
+    </p:extLst>
+  </p:cSld>
+  <p:clrMapOvr>
+    <a:masterClrMapping/>
+  </p:clrMapOvr>
+  <p:timing>
+    <p:tnLst>
+      <p:par>
+        <p:cTn id="1" dur="indefinite" restart="never" nodeType="tmRoot"/>
+      </p:par>
+    </p:tnLst>
+  </p:timing>
+</p:sld>
+</file>
+
+<file path=ppt/slides/slide34.xml><?xml version="1.0" encoding="utf-8"?>
+<p:sld xmlns:a="http://schemas.openxmlformats.org/drawingml/2006/main" xmlns:r="http://schemas.openxmlformats.org/officeDocument/2006/relationships" xmlns:p="http://schemas.openxmlformats.org/presentationml/2006/main">
+  <p:cSld>
+    <p:spTree>
+      <p:nvGrpSpPr>
+        <p:cNvPr id="1" name=""/>
+        <p:cNvGrpSpPr/>
+        <p:nvPr/>
+      </p:nvGrpSpPr>
+      <p:grpSpPr>
+        <a:xfrm>
+          <a:off x="0" y="0"/>
+          <a:ext cx="0" cy="0"/>
+          <a:chOff x="0" y="0"/>
+          <a:chExt cx="0" cy="0"/>
+        </a:xfrm>
+      </p:grpSpPr>
+      <p:sp>
+        <p:nvSpPr>
+          <p:cNvPr id="2" name="Title 1"/>
+          <p:cNvSpPr>
+            <a:spLocks noGrp="1"/>
+          </p:cNvSpPr>
+          <p:nvPr>
+            <p:ph type="title"/>
+          </p:nvPr>
+        </p:nvSpPr>
+        <p:spPr>
+          <a:xfrm>
+            <a:off x="152400" y="2895600"/>
+            <a:ext cx="8839200" cy="838200"/>
+          </a:xfrm>
+        </p:spPr>
+        <p:txBody>
+          <a:bodyPr>
+            <a:noAutofit/>
+          </a:bodyPr>
+          <a:lstStyle/>
+          <a:p>
+            <a:pPr algn="ctr"/>
+            <a:r>
+              <a:rPr lang="da-DK" b="1" dirty="0" smtClean="0"/>
+              <a:t>Thanks!</a:t>
+            </a:r>
+            <a:endParaRPr lang="en-US" dirty="0"/>
+          </a:p>
+        </p:txBody>
+      </p:sp>
+      <p:sp>
+        <p:nvSpPr>
+          <p:cNvPr id="4" name="Slide Number Placeholder 3"/>
+          <p:cNvSpPr>
+            <a:spLocks noGrp="1"/>
+          </p:cNvSpPr>
+          <p:nvPr>
+            <p:ph type="sldNum" sz="quarter" idx="12"/>
+          </p:nvPr>
+        </p:nvSpPr>
+        <p:spPr/>
+        <p:txBody>
+          <a:bodyPr/>
+          <a:lstStyle/>
+          <a:p>
+            <a:pPr>
+              <a:defRPr/>
+            </a:pPr>
+            <a:fld id="{B3B39CE4-1B0F-442B-AED0-7E4EF4FD7138}" type="slidenum">
+              <a:rPr lang="en-US" smtClean="0"/>
+              <a:pPr>
+                <a:defRPr/>
+              </a:pPr>
+              <a:t>34</a:t>
             </a:fld>
             <a:endParaRPr lang="en-US" dirty="0"/>
           </a:p>

</xml_diff>

<commit_message>
fixed broken link in slides
</commit_message>
<xml_diff>
--- a/Lecture_1/ABilandzic_PH8124_SS2022.pptx
+++ b/Lecture_1/ABilandzic_PH8124_SS2022.pptx
@@ -13486,7 +13486,19 @@
             </a:r>
             <a:r>
               <a:rPr lang="en-US" sz="1800" dirty="0"/>
-              <a:t>: https://abilandz.gitbook.io/ss2022/</a:t>
+              <a:t>: </a:t>
+            </a:r>
+            <a:r>
+              <a:rPr lang="en-US" sz="1800" dirty="0">
+                <a:hlinkClick r:id="rId2"/>
+              </a:rPr>
+              <a:t>https://abilandz.gitbook.io/ss2022</a:t>
+            </a:r>
+            <a:r>
+              <a:rPr lang="en-US" sz="1800" dirty="0" smtClean="0">
+                <a:hlinkClick r:id="rId2"/>
+              </a:rPr>
+              <a:t>/</a:t>
             </a:r>
             <a:endParaRPr lang="en-US" dirty="0" smtClean="0"/>
           </a:p>
@@ -13537,7 +13549,7 @@
           <p:nvPr/>
         </p:nvPicPr>
         <p:blipFill>
-          <a:blip r:embed="rId2"/>
+          <a:blip r:embed="rId3"/>
           <a:stretch>
             <a:fillRect/>
           </a:stretch>

</xml_diff>

<commit_message>
Lecture #1, change of offifce
</commit_message>
<xml_diff>
--- a/Lecture_1/ABilandzic_PH8124_SS2022.pptx
+++ b/Lecture_1/ABilandzic_PH8124_SS2022.pptx
@@ -337,7 +337,7 @@
           <a:p>
             <a:fld id="{F929CBCE-E64B-4074-AF48-7FACC033E4C9}" type="datetimeFigureOut">
               <a:rPr lang="en-US" smtClean="0"/>
-              <a:t>4/23/2022</a:t>
+              <a:t>4/29/2022</a:t>
             </a:fld>
             <a:endParaRPr lang="en-US"/>
           </a:p>
@@ -12048,7 +12048,7 @@
         </p:spPr>
         <p:txBody>
           <a:bodyPr vert="horz">
-            <a:normAutofit/>
+            <a:normAutofit fontScale="92500" lnSpcReduction="10000"/>
           </a:bodyPr>
           <a:lstStyle>
             <a:lvl1pPr marL="365760" indent="-256032" algn="l" rtl="0" eaLnBrk="1" latinLnBrk="0" hangingPunct="1">
@@ -12260,11 +12260,53 @@
               </a:rPr>
               <a:t>ante.bilandzic@tum.de</a:t>
             </a:r>
+            <a:endParaRPr lang="da-DK" dirty="0">
+              <a:effectLst/>
+            </a:endParaRPr>
+          </a:p>
+          <a:p>
+            <a:pPr lvl="2" fontAlgn="auto">
+              <a:spcAft>
+                <a:spcPts val="0"/>
+              </a:spcAft>
+            </a:pPr>
             <a:r>
               <a:rPr lang="da-DK" dirty="0" smtClean="0">
                 <a:effectLst/>
               </a:rPr>
-              <a:t>, Office PH 2162</a:t>
+              <a:t>Office </a:t>
+            </a:r>
+            <a:r>
+              <a:rPr lang="da-DK" dirty="0" smtClean="0">
+                <a:effectLst/>
+              </a:rPr>
+              <a:t>PH </a:t>
+            </a:r>
+            <a:r>
+              <a:rPr lang="da-DK" dirty="0">
+                <a:effectLst/>
+              </a:rPr>
+              <a:t>2101 (</a:t>
+            </a:r>
+            <a:r>
+              <a:rPr lang="da-DK" dirty="0">
+                <a:effectLst/>
+                <a:hlinkClick r:id="rId5"/>
+              </a:rPr>
+              <a:t>https://www.ph.tum.de/about/visit/roomfinder/?</a:t>
+            </a:r>
+            <a:r>
+              <a:rPr lang="da-DK" dirty="0" smtClean="0">
+                <a:effectLst/>
+                <a:hlinkClick r:id="rId5"/>
+              </a:rPr>
+              <a:t>room=2101</a:t>
+            </a:r>
+            <a:r>
+              <a:rPr lang="da-DK" dirty="0" smtClean="0">
+                <a:effectLst/>
+              </a:rPr>
+              <a:t>)</a:t>
             </a:r>
             <a:endParaRPr lang="en-US" dirty="0" smtClean="0">
               <a:effectLst/>

</xml_diff>